<commit_message>
Refined presentation and photos
</commit_message>
<xml_diff>
--- a/PPI_Networks_Presentation.pptx
+++ b/PPI_Networks_Presentation.pptx
@@ -5,7 +5,7 @@
     <p:sldMasterId id="2147483725" r:id="rId1"/>
   </p:sldMasterIdLst>
   <p:notesMasterIdLst>
-    <p:notesMasterId r:id="rId15"/>
+    <p:notesMasterId r:id="rId16"/>
   </p:notesMasterIdLst>
   <p:sldIdLst>
     <p:sldId id="256" r:id="rId2"/>
@@ -15,12 +15,13 @@
     <p:sldId id="267" r:id="rId6"/>
     <p:sldId id="259" r:id="rId7"/>
     <p:sldId id="261" r:id="rId8"/>
-    <p:sldId id="262" r:id="rId9"/>
-    <p:sldId id="263" r:id="rId10"/>
-    <p:sldId id="260" r:id="rId11"/>
-    <p:sldId id="264" r:id="rId12"/>
-    <p:sldId id="268" r:id="rId13"/>
-    <p:sldId id="265" r:id="rId14"/>
+    <p:sldId id="269" r:id="rId9"/>
+    <p:sldId id="262" r:id="rId10"/>
+    <p:sldId id="263" r:id="rId11"/>
+    <p:sldId id="260" r:id="rId12"/>
+    <p:sldId id="264" r:id="rId13"/>
+    <p:sldId id="268" r:id="rId14"/>
+    <p:sldId id="265" r:id="rId15"/>
   </p:sldIdLst>
   <p:sldSz cx="9144000" cy="6858000" type="screen4x3"/>
   <p:notesSz cx="6858000" cy="9144000"/>
@@ -4352,60 +4353,97 @@
         <p:spPr>
           <a:xfrm>
             <a:off x="381000" y="1719071"/>
-            <a:ext cx="4271212" cy="4407408"/>
-          </a:xfrm>
-        </p:spPr>
-        <p:txBody>
-          <a:bodyPr>
-            <a:normAutofit lnSpcReduction="10000"/>
-          </a:bodyPr>
-          <a:lstStyle/>
-          <a:p>
-            <a:r>
-              <a:rPr lang="en-US" dirty="0" smtClean="0"/>
-              <a:t>Idea:</a:t>
+            <a:ext cx="8381260" cy="4407408"/>
+          </a:xfrm>
+        </p:spPr>
+        <p:txBody>
+          <a:bodyPr/>
+          <a:lstStyle/>
+          <a:p>
+            <a:r>
+              <a:rPr lang="en-US" dirty="0" err="1" smtClean="0"/>
+              <a:t>nchoosek</a:t>
+            </a:r>
+            <a:r>
+              <a:rPr lang="en-US" dirty="0" smtClean="0"/>
+              <a:t>(|N| - |I|,k-1) *(k-1)! permutations to check</a:t>
             </a:r>
           </a:p>
           <a:p>
             <a:pPr lvl="1"/>
             <a:r>
               <a:rPr lang="en-US" dirty="0" smtClean="0"/>
-              <a:t>Partition nodes in k colors (not like graph coloring...adjacent nodes might have same colors)</a:t>
+              <a:t>If N &gt;&gt; k, about:</a:t>
             </a:r>
           </a:p>
           <a:p>
             <a:pPr lvl="1"/>
             <a:r>
               <a:rPr lang="en-US" dirty="0" smtClean="0"/>
-              <a:t>For each node, sample from Uniform(1,k) to decide color</a:t>
-            </a:r>
-          </a:p>
-          <a:p>
-            <a:r>
-              <a:rPr lang="en-US" dirty="0" smtClean="0"/>
-              <a:t>Start at a node in I and see if there exists a ‘colorful’ path, i.e. a path that has each color</a:t>
-            </a:r>
-          </a:p>
-          <a:p>
-            <a:r>
-              <a:rPr lang="en-US" dirty="0" smtClean="0"/>
-              <a:t>After enough sampling, every path should have been looked at</a:t>
-            </a:r>
-          </a:p>
-          <a:p>
-            <a:r>
-              <a:rPr lang="en-US" dirty="0" smtClean="0"/>
-              <a:t>From literature: </a:t>
+              <a:t>N*(N-1)*...(N-k) about </a:t>
+            </a:r>
+            <a:r>
+              <a:rPr lang="en-US" dirty="0" err="1" smtClean="0"/>
+              <a:t>N^k</a:t>
+            </a:r>
+            <a:r>
+              <a:rPr lang="en-US" dirty="0" smtClean="0"/>
+              <a:t>, thus O(</a:t>
+            </a:r>
+            <a:r>
+              <a:rPr lang="en-US" dirty="0" err="1" smtClean="0"/>
+              <a:t>N^k</a:t>
+            </a:r>
+            <a:r>
+              <a:rPr lang="en-US" dirty="0" smtClean="0"/>
+              <a:t>) time</a:t>
             </a:r>
           </a:p>
           <a:p>
             <a:pPr lvl="1"/>
-            <a:r>
-              <a:rPr lang="en-US" dirty="0" smtClean="0"/>
-              <a:t>O(2^k*k*m) time, where |E| = m</a:t>
-            </a:r>
+            <a:endParaRPr lang="en-US" dirty="0" smtClean="0"/>
+          </a:p>
+          <a:p>
+            <a:r>
+              <a:rPr lang="en-US" dirty="0" smtClean="0"/>
+              <a:t>Takes O(k) time to check whether each path exists</a:t>
+            </a:r>
+          </a:p>
+          <a:p>
+            <a:endParaRPr lang="en-US" dirty="0" smtClean="0"/>
+          </a:p>
+          <a:p>
+            <a:r>
+              <a:rPr lang="en-US" dirty="0" smtClean="0"/>
+              <a:t>If we save the minimum or use a smart data structure (heap), O(1) to get minimum of each (</a:t>
+            </a:r>
+            <a:r>
+              <a:rPr lang="en-US" dirty="0" err="1" smtClean="0"/>
+              <a:t>i,v</a:t>
+            </a:r>
+            <a:r>
+              <a:rPr lang="en-US" dirty="0" smtClean="0"/>
+              <a:t>) path.</a:t>
+            </a:r>
+          </a:p>
+          <a:p>
             <a:endParaRPr lang="en-US" dirty="0"/>
           </a:p>
+          <a:p>
+            <a:r>
+              <a:rPr lang="en-US" dirty="0" smtClean="0"/>
+              <a:t>RUNTIME: O(</a:t>
+            </a:r>
+            <a:r>
+              <a:rPr lang="en-US" dirty="0" err="1" smtClean="0"/>
+              <a:t>N^k</a:t>
+            </a:r>
+            <a:r>
+              <a:rPr lang="en-US" dirty="0" smtClean="0"/>
+              <a:t> * k)...not great</a:t>
+            </a:r>
+            <a:endParaRPr lang="en-US" dirty="0"/>
+          </a:p>
         </p:txBody>
       </p:sp>
       <p:sp>
@@ -4425,7 +4463,7 @@
           <a:p>
             <a:r>
               <a:rPr lang="en-US" dirty="0" smtClean="0"/>
-              <a:t>Coloring Algorithm</a:t>
+              <a:t>Analysis</a:t>
             </a:r>
             <a:endParaRPr lang="en-US" dirty="0"/>
           </a:p>
@@ -4434,13 +4472,20 @@
     </p:spTree>
     <p:extLst>
       <p:ext uri="{BB962C8B-B14F-4D97-AF65-F5344CB8AC3E}">
-        <p14:creationId xmlns:p14="http://schemas.microsoft.com/office/powerpoint/2010/main" val="2831201106"/>
+        <p14:creationId xmlns:p14="http://schemas.microsoft.com/office/powerpoint/2010/main" val="2127887728"/>
       </p:ext>
     </p:extLst>
   </p:cSld>
   <p:clrMapOvr>
     <a:masterClrMapping/>
   </p:clrMapOvr>
+  <p:timing>
+    <p:tnLst>
+      <p:par>
+        <p:cTn xmlns:p14="http://schemas.microsoft.com/office/powerpoint/2010/main" id="1" dur="indefinite" restart="never" nodeType="tmRoot"/>
+      </p:par>
+    </p:tnLst>
+  </p:timing>
 </p:sld>
 </file>
 
@@ -4473,8 +4518,8 @@
         </p:nvSpPr>
         <p:spPr>
           <a:xfrm>
-            <a:off x="381000" y="1719070"/>
-            <a:ext cx="8255000" cy="3481245"/>
+            <a:off x="381000" y="1719071"/>
+            <a:ext cx="4271212" cy="4407408"/>
           </a:xfrm>
         </p:spPr>
         <p:txBody>
@@ -4485,48 +4530,46 @@
           <a:p>
             <a:r>
               <a:rPr lang="en-US" dirty="0" smtClean="0"/>
-              <a:t>Networks are large...and none of these algorithms are very efficient</a:t>
-            </a:r>
-          </a:p>
-          <a:p>
-            <a:endParaRPr lang="en-US" dirty="0" smtClean="0"/>
-          </a:p>
-          <a:p>
-            <a:r>
-              <a:rPr lang="en-US" dirty="0" smtClean="0"/>
-              <a:t>Independence is not really true</a:t>
-            </a:r>
-          </a:p>
-          <a:p>
-            <a:endParaRPr lang="en-US" dirty="0" smtClean="0"/>
-          </a:p>
-          <a:p>
-            <a:r>
-              <a:rPr lang="en-US" dirty="0" smtClean="0"/>
-              <a:t>The coloring algorithm is not very practical to implement </a:t>
-            </a:r>
-          </a:p>
-          <a:p>
-            <a:endParaRPr lang="en-US" dirty="0" smtClean="0"/>
-          </a:p>
-          <a:p>
-            <a:r>
-              <a:rPr lang="en-US" dirty="0"/>
-              <a:t>W</a:t>
-            </a:r>
-            <a:r>
-              <a:rPr lang="en-US" dirty="0" smtClean="0"/>
-              <a:t>ith enough sampling we still could miss the minimum path</a:t>
+              <a:t>Idea:</a:t>
             </a:r>
           </a:p>
           <a:p>
             <a:pPr lvl="1"/>
-            <a:endParaRPr lang="en-US" dirty="0" smtClean="0"/>
-          </a:p>
-          <a:p>
-            <a:r>
-              <a:rPr lang="en-US" dirty="0" smtClean="0"/>
-              <a:t>Algorithms get more complicated</a:t>
+            <a:r>
+              <a:rPr lang="en-US" dirty="0" smtClean="0"/>
+              <a:t>Partition nodes in k colors (not like graph coloring...adjacent nodes might have same colors)</a:t>
+            </a:r>
+          </a:p>
+          <a:p>
+            <a:pPr lvl="1"/>
+            <a:r>
+              <a:rPr lang="en-US" dirty="0" smtClean="0"/>
+              <a:t>For each node, sample from Uniform(1,k) to decide color</a:t>
+            </a:r>
+          </a:p>
+          <a:p>
+            <a:r>
+              <a:rPr lang="en-US" dirty="0" smtClean="0"/>
+              <a:t>Start at a node in I and see if there exists a ‘colorful’ path, i.e. a path that has each color</a:t>
+            </a:r>
+          </a:p>
+          <a:p>
+            <a:r>
+              <a:rPr lang="en-US" dirty="0" smtClean="0"/>
+              <a:t>After enough sampling, every path should have been looked at</a:t>
+            </a:r>
+          </a:p>
+          <a:p>
+            <a:r>
+              <a:rPr lang="en-US" dirty="0" smtClean="0"/>
+              <a:t>From literature: </a:t>
+            </a:r>
+          </a:p>
+          <a:p>
+            <a:pPr lvl="1"/>
+            <a:r>
+              <a:rPr lang="en-US" dirty="0" smtClean="0"/>
+              <a:t>O(2^k*k*m) time, where |E| = m</a:t>
             </a:r>
             <a:endParaRPr lang="en-US" dirty="0"/>
           </a:p>
@@ -4549,16 +4592,126 @@
           <a:p>
             <a:r>
               <a:rPr lang="en-US" dirty="0" smtClean="0"/>
-              <a:t>Realities</a:t>
+              <a:t>Coloring Coding</a:t>
             </a:r>
             <a:endParaRPr lang="en-US" dirty="0"/>
+          </a:p>
+        </p:txBody>
+      </p:sp>
+      <p:pic>
+        <p:nvPicPr>
+          <p:cNvPr id="4" name="Picture 3" descr="Screen Shot 2015-11-29 at 1.44.06 PM.png"/>
+          <p:cNvPicPr>
+            <a:picLocks noChangeAspect="1"/>
+          </p:cNvPicPr>
+          <p:nvPr/>
+        </p:nvPicPr>
+        <p:blipFill>
+          <a:blip r:embed="rId2">
+            <a:extLst>
+              <a:ext uri="{28A0092B-C50C-407E-A947-70E740481C1C}">
+                <a14:useLocalDpi xmlns:a14="http://schemas.microsoft.com/office/drawing/2010/main" val="0"/>
+              </a:ext>
+            </a:extLst>
+          </a:blip>
+          <a:stretch>
+            <a:fillRect/>
+          </a:stretch>
+        </p:blipFill>
+        <p:spPr>
+          <a:xfrm>
+            <a:off x="5131823" y="1862666"/>
+            <a:ext cx="1078407" cy="4416778"/>
+          </a:xfrm>
+          <a:prstGeom prst="rect">
+            <a:avLst/>
+          </a:prstGeom>
+        </p:spPr>
+      </p:pic>
+      <p:sp>
+        <p:nvSpPr>
+          <p:cNvPr id="5" name="TextBox 4"/>
+          <p:cNvSpPr txBox="1"/>
+          <p:nvPr/>
+        </p:nvSpPr>
+        <p:spPr>
+          <a:xfrm>
+            <a:off x="6128781" y="2979171"/>
+            <a:ext cx="2633479" cy="1815882"/>
+          </a:xfrm>
+          <a:prstGeom prst="rect">
+            <a:avLst/>
+          </a:prstGeom>
+          <a:noFill/>
+        </p:spPr>
+        <p:txBody>
+          <a:bodyPr wrap="square" rtlCol="0">
+            <a:spAutoFit/>
+          </a:bodyPr>
+          <a:lstStyle/>
+          <a:p>
+            <a:pPr algn="r"/>
+            <a:r>
+              <a:rPr lang="en-US" sz="2400" dirty="0" smtClean="0"/>
+              <a:t>Colorful k paths are kept</a:t>
+            </a:r>
+          </a:p>
+          <a:p>
+            <a:pPr algn="r"/>
+            <a:endParaRPr lang="en-US" sz="2400" dirty="0"/>
+          </a:p>
+          <a:p>
+            <a:pPr algn="r"/>
+            <a:r>
+              <a:rPr lang="en-US" sz="800" dirty="0" smtClean="0"/>
+              <a:t>Source: </a:t>
+            </a:r>
+            <a:r>
+              <a:rPr lang="en-US" sz="800" dirty="0" smtClean="0">
+                <a:hlinkClick r:id="rId3"/>
+              </a:rPr>
+              <a:t>https://</a:t>
+            </a:r>
+            <a:r>
+              <a:rPr lang="en-US" sz="800" dirty="0" err="1" smtClean="0">
+                <a:hlinkClick r:id="rId3"/>
+              </a:rPr>
+              <a:t>www.cs.umd.edu</a:t>
+            </a:r>
+            <a:r>
+              <a:rPr lang="en-US" sz="800" dirty="0" smtClean="0">
+                <a:hlinkClick r:id="rId3"/>
+              </a:rPr>
+              <a:t>/class/fall2009/cmsc858l/</a:t>
+            </a:r>
+            <a:r>
+              <a:rPr lang="en-US" sz="800" dirty="0" err="1" smtClean="0">
+                <a:hlinkClick r:id="rId3"/>
+              </a:rPr>
+              <a:t>lecs</a:t>
+            </a:r>
+            <a:r>
+              <a:rPr lang="en-US" sz="800" dirty="0" smtClean="0">
+                <a:hlinkClick r:id="rId3"/>
+              </a:rPr>
+              <a:t>/Lec14-colorcode.pdf</a:t>
+            </a:r>
+            <a:endParaRPr lang="en-US" sz="800" dirty="0" smtClean="0"/>
+          </a:p>
+          <a:p>
+            <a:pPr algn="r"/>
+            <a:endParaRPr lang="en-US" sz="800" dirty="0"/>
+          </a:p>
+          <a:p>
+            <a:pPr algn="r"/>
+            <a:endParaRPr lang="en-US" sz="800" dirty="0"/>
           </a:p>
         </p:txBody>
       </p:sp>
     </p:spTree>
     <p:extLst>
       <p:ext uri="{BB962C8B-B14F-4D97-AF65-F5344CB8AC3E}">
-        <p14:creationId xmlns:p14="http://schemas.microsoft.com/office/powerpoint/2010/main" val="3549342983"/>
+        <p14:creationId xmlns:p14="http://schemas.microsoft.com/office/powerpoint/2010/main" val="2831201106"/>
       </p:ext>
     </p:extLst>
   </p:cSld>
@@ -4595,15 +4748,120 @@
             <p:ph idx="1"/>
           </p:nvPr>
         </p:nvSpPr>
+        <p:spPr>
+          <a:xfrm>
+            <a:off x="381000" y="1719070"/>
+            <a:ext cx="8255000" cy="3481245"/>
+          </a:xfrm>
+        </p:spPr>
+        <p:txBody>
+          <a:bodyPr>
+            <a:normAutofit lnSpcReduction="10000"/>
+          </a:bodyPr>
+          <a:lstStyle/>
+          <a:p>
+            <a:r>
+              <a:rPr lang="en-US" dirty="0" smtClean="0"/>
+              <a:t>Networks are large...and none of these algorithms are very efficient</a:t>
+            </a:r>
+          </a:p>
+          <a:p>
+            <a:endParaRPr lang="en-US" dirty="0" smtClean="0"/>
+          </a:p>
+          <a:p>
+            <a:r>
+              <a:rPr lang="en-US" dirty="0" smtClean="0"/>
+              <a:t>Independence is not really true</a:t>
+            </a:r>
+          </a:p>
+          <a:p>
+            <a:endParaRPr lang="en-US" dirty="0" smtClean="0"/>
+          </a:p>
+          <a:p>
+            <a:r>
+              <a:rPr lang="en-US" dirty="0" smtClean="0"/>
+              <a:t>The coloring algorithm is not very practical to implement </a:t>
+            </a:r>
+          </a:p>
+          <a:p>
+            <a:endParaRPr lang="en-US" dirty="0" smtClean="0"/>
+          </a:p>
+          <a:p>
+            <a:r>
+              <a:rPr lang="en-US" dirty="0"/>
+              <a:t>W</a:t>
+            </a:r>
+            <a:r>
+              <a:rPr lang="en-US" dirty="0" smtClean="0"/>
+              <a:t>ith enough sampling we still could miss the minimum path</a:t>
+            </a:r>
+          </a:p>
+          <a:p>
+            <a:pPr lvl="1"/>
+            <a:endParaRPr lang="en-US" dirty="0" smtClean="0"/>
+          </a:p>
+          <a:p>
+            <a:r>
+              <a:rPr lang="en-US" dirty="0" smtClean="0"/>
+              <a:t>Algorithms get more complicated</a:t>
+            </a:r>
+            <a:endParaRPr lang="en-US" dirty="0"/>
+          </a:p>
+        </p:txBody>
+      </p:sp>
+      <p:sp>
+        <p:nvSpPr>
+          <p:cNvPr id="3" name="Title 2"/>
+          <p:cNvSpPr>
+            <a:spLocks noGrp="1"/>
+          </p:cNvSpPr>
+          <p:nvPr>
+            <p:ph type="title"/>
+          </p:nvPr>
+        </p:nvSpPr>
         <p:spPr/>
         <p:txBody>
           <a:bodyPr/>
           <a:lstStyle/>
           <a:p>
-            <a:endParaRPr lang="en-US"/>
-          </a:p>
-        </p:txBody>
-      </p:sp>
+            <a:r>
+              <a:rPr lang="en-US" dirty="0" smtClean="0"/>
+              <a:t>Realities</a:t>
+            </a:r>
+            <a:endParaRPr lang="en-US" dirty="0"/>
+          </a:p>
+        </p:txBody>
+      </p:sp>
+    </p:spTree>
+    <p:extLst>
+      <p:ext uri="{BB962C8B-B14F-4D97-AF65-F5344CB8AC3E}">
+        <p14:creationId xmlns:p14="http://schemas.microsoft.com/office/powerpoint/2010/main" val="3549342983"/>
+      </p:ext>
+    </p:extLst>
+  </p:cSld>
+  <p:clrMapOvr>
+    <a:masterClrMapping/>
+  </p:clrMapOvr>
+</p:sld>
+</file>
+
+<file path=ppt/slides/slide13.xml><?xml version="1.0" encoding="utf-8"?>
+<p:sld xmlns:a="http://schemas.openxmlformats.org/drawingml/2006/main" xmlns:r="http://schemas.openxmlformats.org/officeDocument/2006/relationships" xmlns:p="http://schemas.openxmlformats.org/presentationml/2006/main">
+  <p:cSld>
+    <p:spTree>
+      <p:nvGrpSpPr>
+        <p:cNvPr id="1" name=""/>
+        <p:cNvGrpSpPr/>
+        <p:nvPr/>
+      </p:nvGrpSpPr>
+      <p:grpSpPr>
+        <a:xfrm>
+          <a:off x="0" y="0"/>
+          <a:ext cx="0" cy="0"/>
+          <a:chOff x="0" y="0"/>
+          <a:chExt cx="0" cy="0"/>
+        </a:xfrm>
+      </p:grpSpPr>
       <p:sp>
         <p:nvSpPr>
           <p:cNvPr id="3" name="Title 2"/>
@@ -4624,6 +4882,94 @@
               <a:t>Realities</a:t>
             </a:r>
             <a:endParaRPr lang="en-US" dirty="0"/>
+          </a:p>
+        </p:txBody>
+      </p:sp>
+      <p:pic>
+        <p:nvPicPr>
+          <p:cNvPr id="4" name="Picture 3" descr="Networks_Poster.jpeg"/>
+          <p:cNvPicPr>
+            <a:picLocks noChangeAspect="1"/>
+          </p:cNvPicPr>
+          <p:nvPr/>
+        </p:nvPicPr>
+        <p:blipFill>
+          <a:blip r:embed="rId2">
+            <a:extLst>
+              <a:ext uri="{28A0092B-C50C-407E-A947-70E740481C1C}">
+                <a14:useLocalDpi xmlns:a14="http://schemas.microsoft.com/office/drawing/2010/main" val="0"/>
+              </a:ext>
+            </a:extLst>
+          </a:blip>
+          <a:stretch>
+            <a:fillRect/>
+          </a:stretch>
+        </p:blipFill>
+        <p:spPr>
+          <a:xfrm>
+            <a:off x="1340555" y="1656905"/>
+            <a:ext cx="6477001" cy="4567288"/>
+          </a:xfrm>
+          <a:prstGeom prst="rect">
+            <a:avLst/>
+          </a:prstGeom>
+        </p:spPr>
+      </p:pic>
+      <p:sp>
+        <p:nvSpPr>
+          <p:cNvPr id="6" name="TextBox 5"/>
+          <p:cNvSpPr txBox="1"/>
+          <p:nvPr/>
+        </p:nvSpPr>
+        <p:spPr>
+          <a:xfrm>
+            <a:off x="1907227" y="6153638"/>
+            <a:ext cx="4818576" cy="553998"/>
+          </a:xfrm>
+          <a:prstGeom prst="rect">
+            <a:avLst/>
+          </a:prstGeom>
+          <a:noFill/>
+        </p:spPr>
+        <p:txBody>
+          <a:bodyPr wrap="square" rtlCol="0">
+            <a:spAutoFit/>
+          </a:bodyPr>
+          <a:lstStyle/>
+          <a:p>
+            <a:r>
+              <a:rPr lang="en-US" sz="1000" dirty="0" smtClean="0"/>
+              <a:t>You can get this poster for free! </a:t>
+            </a:r>
+            <a:r>
+              <a:rPr lang="en-US" sz="1000" dirty="0" smtClean="0">
+                <a:sym typeface="Wingdings"/>
+              </a:rPr>
+              <a:t></a:t>
+            </a:r>
+            <a:r>
+              <a:rPr lang="en-US" sz="1000" dirty="0">
+                <a:sym typeface="Wingdings"/>
+              </a:rPr>
+              <a:t> </a:t>
+            </a:r>
+            <a:r>
+              <a:rPr lang="en-US" sz="1000" dirty="0" smtClean="0">
+                <a:sym typeface="Wingdings"/>
+              </a:rPr>
+              <a:t>Source:</a:t>
+            </a:r>
+            <a:r>
+              <a:rPr lang="en-US" sz="1000" dirty="0" smtClean="0"/>
+              <a:t> </a:t>
+            </a:r>
+            <a:r>
+              <a:rPr lang="en-US" sz="1000" dirty="0" smtClean="0">
+                <a:hlinkClick r:id="rId3"/>
+              </a:rPr>
+              <a:t>https://www.quora.com/What-are-some-of-the-most-amazing-molecular-and-cellular-biology-diagrams</a:t>
+            </a:r>
+            <a:endParaRPr lang="en-US" sz="1000" dirty="0"/>
           </a:p>
         </p:txBody>
       </p:sp>
@@ -4640,7 +4986,7 @@
 </p:sld>
 </file>
 
-<file path=ppt/slides/slide13.xml><?xml version="1.0" encoding="utf-8"?>
+<file path=ppt/slides/slide14.xml><?xml version="1.0" encoding="utf-8"?>
 <p:sld xmlns:a="http://schemas.openxmlformats.org/drawingml/2006/main" xmlns:r="http://schemas.openxmlformats.org/officeDocument/2006/relationships" xmlns:p="http://schemas.openxmlformats.org/presentationml/2006/main">
   <p:cSld>
     <p:spTree>
@@ -6359,7 +6705,7 @@
         </p:nvCxnSpPr>
         <p:spPr>
           <a:xfrm>
-            <a:off x="4202884" y="2243668"/>
+            <a:off x="4231106" y="2243668"/>
             <a:ext cx="1951788" cy="0"/>
           </a:xfrm>
           <a:prstGeom prst="line">
@@ -6435,7 +6781,7 @@
         </p:nvSpPr>
         <p:spPr>
           <a:xfrm>
-            <a:off x="381000" y="1719071"/>
+            <a:off x="381000" y="1704960"/>
             <a:ext cx="8381260" cy="4866266"/>
           </a:xfrm>
         </p:spPr>
@@ -6700,6 +7046,51 @@
           </a:p>
           <a:p>
             <a:endParaRPr lang="en-US" dirty="0"/>
+          </a:p>
+        </p:txBody>
+      </p:sp>
+      <p:sp>
+        <p:nvSpPr>
+          <p:cNvPr id="7" name="TextBox 6"/>
+          <p:cNvSpPr txBox="1"/>
+          <p:nvPr/>
+        </p:nvSpPr>
+        <p:spPr>
+          <a:xfrm>
+            <a:off x="3922892" y="6088977"/>
+            <a:ext cx="4818576" cy="553998"/>
+          </a:xfrm>
+          <a:prstGeom prst="rect">
+            <a:avLst/>
+          </a:prstGeom>
+          <a:noFill/>
+        </p:spPr>
+        <p:txBody>
+          <a:bodyPr wrap="square" rtlCol="0">
+            <a:spAutoFit/>
+          </a:bodyPr>
+          <a:lstStyle/>
+          <a:p>
+            <a:r>
+              <a:rPr lang="en-US" sz="1000" dirty="0" err="1" smtClean="0"/>
+              <a:t>Pircure</a:t>
+            </a:r>
+            <a:r>
+              <a:rPr lang="en-US" sz="1000" dirty="0" smtClean="0"/>
+              <a:t> of the idea: Set of nodes {I} and finding path with k nodes to V.   Source:</a:t>
+            </a:r>
+          </a:p>
+          <a:p>
+            <a:r>
+              <a:rPr lang="en-US" sz="1000" dirty="0" smtClean="0">
+                <a:hlinkClick r:id="rId3"/>
+              </a:rPr>
+              <a:t>https://www.cs.umd.edu/class/fall2009/cmsc858l/lecs/Lec14-colorcode.pdf</a:t>
+            </a:r>
+            <a:endParaRPr lang="en-US" sz="1000" dirty="0" smtClean="0"/>
+          </a:p>
+          <a:p>
+            <a:endParaRPr lang="en-US" sz="1000" dirty="0"/>
           </a:p>
         </p:txBody>
       </p:sp>
@@ -6753,60 +7144,187 @@
         <p:spPr>
           <a:xfrm>
             <a:off x="381000" y="1719071"/>
-            <a:ext cx="4271212" cy="4407408"/>
-          </a:xfrm>
-        </p:spPr>
+            <a:ext cx="4388556" cy="4757929"/>
+          </a:xfrm>
+        </p:spPr>
+        <p:txBody>
+          <a:bodyPr>
+            <a:normAutofit lnSpcReduction="10000"/>
+          </a:bodyPr>
+          <a:lstStyle/>
+          <a:p>
+            <a:r>
+              <a:rPr lang="en-US" dirty="0" smtClean="0"/>
+              <a:t>Inputs:</a:t>
+            </a:r>
+          </a:p>
+          <a:p>
+            <a:pPr lvl="1"/>
+            <a:r>
+              <a:rPr lang="en-US" dirty="0" smtClean="0"/>
+              <a:t>3 Column Matrix N = [</a:t>
+            </a:r>
+            <a:r>
+              <a:rPr lang="en-US" dirty="0" err="1" smtClean="0"/>
+              <a:t>i</a:t>
+            </a:r>
+            <a:r>
+              <a:rPr lang="en-US" dirty="0" smtClean="0"/>
+              <a:t> j P(</a:t>
+            </a:r>
+            <a:r>
+              <a:rPr lang="en-US" dirty="0" err="1" smtClean="0"/>
+              <a:t>i,j</a:t>
+            </a:r>
+            <a:r>
+              <a:rPr lang="en-US" dirty="0" smtClean="0"/>
+              <a:t>)]</a:t>
+            </a:r>
+          </a:p>
+          <a:p>
+            <a:pPr lvl="1"/>
+            <a:r>
+              <a:rPr lang="en-US" dirty="0" smtClean="0"/>
+              <a:t>Column Vector of Nodes in I</a:t>
+            </a:r>
+          </a:p>
+          <a:p>
+            <a:pPr lvl="1"/>
+            <a:r>
+              <a:rPr lang="en-US" dirty="0" smtClean="0"/>
+              <a:t>K</a:t>
+            </a:r>
+          </a:p>
+          <a:p>
+            <a:pPr marL="365760" lvl="1" indent="0">
+              <a:buNone/>
+            </a:pPr>
+            <a:endParaRPr lang="en-US" dirty="0" smtClean="0"/>
+          </a:p>
+          <a:p>
+            <a:r>
+              <a:rPr lang="en-US" dirty="0" smtClean="0"/>
+              <a:t>Running the algorithm</a:t>
+            </a:r>
+          </a:p>
+          <a:p>
+            <a:pPr lvl="1"/>
+            <a:r>
+              <a:rPr lang="en-US" dirty="0" err="1" smtClean="0"/>
+              <a:t>ColorCoding</a:t>
+            </a:r>
+            <a:r>
+              <a:rPr lang="en-US" dirty="0" smtClean="0"/>
+              <a:t>(N, I k)</a:t>
+            </a:r>
+          </a:p>
+          <a:p>
+            <a:pPr lvl="2"/>
+            <a:r>
+              <a:rPr lang="en-US" dirty="0" smtClean="0"/>
+              <a:t>Main function with inputs as above</a:t>
+            </a:r>
+          </a:p>
+          <a:p>
+            <a:pPr lvl="2"/>
+            <a:r>
+              <a:rPr lang="en-US" dirty="0" smtClean="0"/>
+              <a:t>Outputs a matrix where:</a:t>
+            </a:r>
+          </a:p>
+          <a:p>
+            <a:pPr lvl="3"/>
+            <a:r>
+              <a:rPr lang="en-US" dirty="0" smtClean="0"/>
+              <a:t>Rows = # of length k paths from </a:t>
+            </a:r>
+            <a:r>
+              <a:rPr lang="en-US" dirty="0" err="1" smtClean="0"/>
+              <a:t>i</a:t>
+            </a:r>
+            <a:endParaRPr lang="en-US" dirty="0" smtClean="0"/>
+          </a:p>
+          <a:p>
+            <a:pPr lvl="3"/>
+            <a:r>
+              <a:rPr lang="en-US" dirty="0" smtClean="0"/>
+              <a:t>Columns = nodes in path</a:t>
+            </a:r>
+          </a:p>
+          <a:p>
+            <a:pPr lvl="3"/>
+            <a:r>
+              <a:rPr lang="en-US" dirty="0" smtClean="0"/>
+              <a:t>Last column = probability of path</a:t>
+            </a:r>
+          </a:p>
+          <a:p>
+            <a:pPr lvl="3"/>
+            <a:r>
+              <a:rPr lang="en-US" dirty="0" smtClean="0"/>
+              <a:t>Each path is the most likely (</a:t>
+            </a:r>
+            <a:r>
+              <a:rPr lang="en-US" dirty="0" err="1" smtClean="0"/>
+              <a:t>i,v</a:t>
+            </a:r>
+            <a:r>
+              <a:rPr lang="en-US" dirty="0" smtClean="0"/>
+              <a:t>) path of length k</a:t>
+            </a:r>
+          </a:p>
+          <a:p>
+            <a:pPr lvl="3"/>
+            <a:endParaRPr lang="en-US" dirty="0"/>
+          </a:p>
+          <a:p>
+            <a:r>
+              <a:rPr lang="en-US" dirty="0" smtClean="0"/>
+              <a:t>See </a:t>
+            </a:r>
+            <a:r>
+              <a:rPr lang="en-US" dirty="0" err="1" smtClean="0"/>
+              <a:t>README.txt</a:t>
+            </a:r>
+            <a:r>
+              <a:rPr lang="en-US" dirty="0" smtClean="0"/>
+              <a:t> in PROGRAMS</a:t>
+            </a:r>
+          </a:p>
+          <a:p>
+            <a:pPr lvl="1"/>
+            <a:endParaRPr lang="en-US" dirty="0" smtClean="0"/>
+          </a:p>
+          <a:p>
+            <a:pPr lvl="1"/>
+            <a:endParaRPr lang="en-US" dirty="0" smtClean="0"/>
+          </a:p>
+          <a:p>
+            <a:pPr marL="365760" lvl="1" indent="0">
+              <a:buNone/>
+            </a:pPr>
+            <a:endParaRPr lang="en-US" dirty="0" smtClean="0"/>
+          </a:p>
+        </p:txBody>
+      </p:sp>
+      <p:sp>
+        <p:nvSpPr>
+          <p:cNvPr id="3" name="Title 2"/>
+          <p:cNvSpPr>
+            <a:spLocks noGrp="1"/>
+          </p:cNvSpPr>
+          <p:nvPr>
+            <p:ph type="title"/>
+          </p:nvPr>
+        </p:nvSpPr>
+        <p:spPr/>
         <p:txBody>
           <a:bodyPr/>
           <a:lstStyle/>
           <a:p>
             <a:r>
               <a:rPr lang="en-US" dirty="0" smtClean="0"/>
-              <a:t>Example with k = 3 paths:</a:t>
-            </a:r>
-          </a:p>
-          <a:p>
-            <a:endParaRPr lang="en-US" dirty="0"/>
-          </a:p>
-          <a:p>
-            <a:endParaRPr lang="en-US" dirty="0" smtClean="0"/>
-          </a:p>
-          <a:p>
-            <a:endParaRPr lang="en-US" dirty="0"/>
-          </a:p>
-          <a:p>
-            <a:endParaRPr lang="en-US" dirty="0" smtClean="0"/>
-          </a:p>
-          <a:p>
-            <a:endParaRPr lang="en-US" dirty="0"/>
-          </a:p>
-          <a:p>
-            <a:r>
-              <a:rPr lang="en-US" dirty="0" smtClean="0"/>
-              <a:t>Example with k = 4 paths:</a:t>
-            </a:r>
-            <a:endParaRPr lang="en-US" dirty="0"/>
-          </a:p>
-        </p:txBody>
-      </p:sp>
-      <p:sp>
-        <p:nvSpPr>
-          <p:cNvPr id="3" name="Title 2"/>
-          <p:cNvSpPr>
-            <a:spLocks noGrp="1"/>
-          </p:cNvSpPr>
-          <p:nvPr>
-            <p:ph type="title"/>
-          </p:nvPr>
-        </p:nvSpPr>
-        <p:spPr/>
-        <p:txBody>
-          <a:bodyPr/>
-          <a:lstStyle/>
-          <a:p>
-            <a:r>
-              <a:rPr lang="en-US" dirty="0" smtClean="0"/>
-              <a:t>Example</a:t>
+              <a:t>Implementation</a:t>
             </a:r>
             <a:endParaRPr lang="en-US" dirty="0"/>
           </a:p>
@@ -6814,7 +7332,7 @@
       </p:sp>
       <p:pic>
         <p:nvPicPr>
-          <p:cNvPr id="4" name="Picture 3" descr="Test_Graph.tiff"/>
+          <p:cNvPr id="7" name="Picture 6" descr="Test_Graph.tiff"/>
           <p:cNvPicPr>
             <a:picLocks noChangeAspect="1"/>
           </p:cNvPicPr>
@@ -6844,7 +7362,7 @@
       </p:pic>
       <p:cxnSp>
         <p:nvCxnSpPr>
-          <p:cNvPr id="5" name="Straight Connector 4"/>
+          <p:cNvPr id="8" name="Straight Connector 7"/>
           <p:cNvCxnSpPr/>
           <p:nvPr/>
         </p:nvCxnSpPr>
@@ -6911,7 +7429,7 @@
     </p:spTree>
     <p:extLst>
       <p:ext uri="{BB962C8B-B14F-4D97-AF65-F5344CB8AC3E}">
-        <p14:creationId xmlns:p14="http://schemas.microsoft.com/office/powerpoint/2010/main" val="2155405247"/>
+        <p14:creationId xmlns:p14="http://schemas.microsoft.com/office/powerpoint/2010/main" val="3675846235"/>
       </p:ext>
     </p:extLst>
   </p:cSld>
@@ -6966,67 +7484,38 @@
           <a:lstStyle/>
           <a:p>
             <a:r>
-              <a:rPr lang="en-US" dirty="0" err="1" smtClean="0"/>
-              <a:t>nchoosek</a:t>
-            </a:r>
-            <a:r>
-              <a:rPr lang="en-US" dirty="0" smtClean="0"/>
-              <a:t>(|N| - |I|,k-1) *(k-1)! permutations to check</a:t>
-            </a:r>
-          </a:p>
-          <a:p>
-            <a:pPr lvl="1"/>
-            <a:r>
-              <a:rPr lang="en-US" dirty="0" smtClean="0"/>
-              <a:t>Using Sterling’s Approximation is N &gt;&gt; k, about O(</a:t>
-            </a:r>
-            <a:r>
-              <a:rPr lang="en-US" dirty="0" err="1" smtClean="0"/>
-              <a:t>N^k</a:t>
-            </a:r>
-            <a:r>
-              <a:rPr lang="en-US" dirty="0" smtClean="0"/>
-              <a:t>) time</a:t>
-            </a:r>
-          </a:p>
-          <a:p>
-            <a:r>
-              <a:rPr lang="en-US" dirty="0" smtClean="0"/>
-              <a:t>Takes O(k) time to check whether each path exists</a:t>
-            </a:r>
-          </a:p>
-          <a:p>
-            <a:r>
-              <a:rPr lang="en-US" dirty="0" smtClean="0"/>
-              <a:t>If we save the minimum or use a smart data structure (heap), O(1) to get minimum of each (</a:t>
-            </a:r>
-            <a:r>
-              <a:rPr lang="en-US" dirty="0" err="1" smtClean="0"/>
-              <a:t>i,v</a:t>
-            </a:r>
-            <a:r>
-              <a:rPr lang="en-US" dirty="0" smtClean="0"/>
-              <a:t>) path.</a:t>
+              <a:rPr lang="en-US" dirty="0" smtClean="0"/>
+              <a:t>Example with k = 3 paths:</a:t>
             </a:r>
           </a:p>
           <a:p>
             <a:endParaRPr lang="en-US" dirty="0"/>
           </a:p>
           <a:p>
-            <a:r>
-              <a:rPr lang="en-US" dirty="0" smtClean="0"/>
-              <a:t>RUNTIME: O(</a:t>
-            </a:r>
-            <a:r>
-              <a:rPr lang="en-US" dirty="0" err="1" smtClean="0"/>
-              <a:t>N^k</a:t>
-            </a:r>
-            <a:r>
-              <a:rPr lang="en-US" dirty="0" smtClean="0"/>
-              <a:t> * k)...not great</a:t>
-            </a:r>
+            <a:endParaRPr lang="en-US" dirty="0" smtClean="0"/>
+          </a:p>
+          <a:p>
             <a:endParaRPr lang="en-US" dirty="0"/>
           </a:p>
+          <a:p>
+            <a:endParaRPr lang="en-US" dirty="0" smtClean="0"/>
+          </a:p>
+          <a:p>
+            <a:endParaRPr lang="en-US" dirty="0" smtClean="0"/>
+          </a:p>
+          <a:p>
+            <a:endParaRPr lang="en-US" dirty="0"/>
+          </a:p>
+          <a:p>
+            <a:endParaRPr lang="en-US" dirty="0" smtClean="0"/>
+          </a:p>
+          <a:p>
+            <a:r>
+              <a:rPr lang="en-US" dirty="0" smtClean="0"/>
+              <a:t>Example with k = 4 paths:</a:t>
+            </a:r>
+            <a:endParaRPr lang="en-US" dirty="0"/>
+          </a:p>
         </p:txBody>
       </p:sp>
       <p:sp>
@@ -7046,16 +7535,514 @@
           <a:p>
             <a:r>
               <a:rPr lang="en-US" dirty="0" smtClean="0"/>
-              <a:t>Analysis</a:t>
+              <a:t>Example</a:t>
             </a:r>
             <a:endParaRPr lang="en-US" dirty="0"/>
+          </a:p>
+        </p:txBody>
+      </p:sp>
+      <p:pic>
+        <p:nvPicPr>
+          <p:cNvPr id="4" name="Picture 3" descr="Test_Graph.tiff"/>
+          <p:cNvPicPr>
+            <a:picLocks noChangeAspect="1"/>
+          </p:cNvPicPr>
+          <p:nvPr/>
+        </p:nvPicPr>
+        <p:blipFill>
+          <a:blip r:embed="rId2">
+            <a:extLst>
+              <a:ext uri="{28A0092B-C50C-407E-A947-70E740481C1C}">
+                <a14:useLocalDpi xmlns:a14="http://schemas.microsoft.com/office/drawing/2010/main" val="0"/>
+              </a:ext>
+            </a:extLst>
+          </a:blip>
+          <a:stretch>
+            <a:fillRect/>
+          </a:stretch>
+        </p:blipFill>
+        <p:spPr>
+          <a:xfrm>
+            <a:off x="4892101" y="1719071"/>
+            <a:ext cx="3734976" cy="3230033"/>
+          </a:xfrm>
+          <a:prstGeom prst="rect">
+            <a:avLst/>
+          </a:prstGeom>
+        </p:spPr>
+      </p:pic>
+      <p:cxnSp>
+        <p:nvCxnSpPr>
+          <p:cNvPr id="5" name="Straight Connector 4"/>
+          <p:cNvCxnSpPr/>
+          <p:nvPr/>
+        </p:nvCxnSpPr>
+        <p:spPr>
+          <a:xfrm>
+            <a:off x="4892101" y="2159001"/>
+            <a:ext cx="3734976" cy="0"/>
+          </a:xfrm>
+          <a:prstGeom prst="line">
+            <a:avLst/>
+          </a:prstGeom>
+          <a:ln w="28575" cmpd="sng">
+            <a:solidFill>
+              <a:srgbClr val="C66951"/>
+            </a:solidFill>
+          </a:ln>
+        </p:spPr>
+        <p:style>
+          <a:lnRef idx="2">
+            <a:schemeClr val="accent1"/>
+          </a:lnRef>
+          <a:fillRef idx="0">
+            <a:schemeClr val="accent1"/>
+          </a:fillRef>
+          <a:effectRef idx="1">
+            <a:schemeClr val="accent1"/>
+          </a:effectRef>
+          <a:fontRef idx="minor">
+            <a:schemeClr val="tx1"/>
+          </a:fontRef>
+        </p:style>
+      </p:cxnSp>
+      <p:sp>
+        <p:nvSpPr>
+          <p:cNvPr id="9" name="TextBox 8"/>
+          <p:cNvSpPr txBox="1"/>
+          <p:nvPr/>
+        </p:nvSpPr>
+        <p:spPr>
+          <a:xfrm>
+            <a:off x="5993598" y="5007275"/>
+            <a:ext cx="2633479" cy="461665"/>
+          </a:xfrm>
+          <a:prstGeom prst="rect">
+            <a:avLst/>
+          </a:prstGeom>
+          <a:noFill/>
+        </p:spPr>
+        <p:txBody>
+          <a:bodyPr wrap="square" rtlCol="0">
+            <a:spAutoFit/>
+          </a:bodyPr>
+          <a:lstStyle/>
+          <a:p>
+            <a:pPr algn="r"/>
+            <a:r>
+              <a:rPr lang="en-US" sz="2400" dirty="0" smtClean="0"/>
+              <a:t>I = {1,2,3,4}</a:t>
+            </a:r>
+            <a:endParaRPr lang="en-US" sz="2400" dirty="0"/>
+          </a:p>
+        </p:txBody>
+      </p:sp>
+      <p:pic>
+        <p:nvPicPr>
+          <p:cNvPr id="10" name="Picture 9" descr="Test_Graph_k_3.png"/>
+          <p:cNvPicPr>
+            <a:picLocks noChangeAspect="1"/>
+          </p:cNvPicPr>
+          <p:nvPr/>
+        </p:nvPicPr>
+        <p:blipFill>
+          <a:blip r:embed="rId3">
+            <a:extLst>
+              <a:ext uri="{28A0092B-C50C-407E-A947-70E740481C1C}">
+                <a14:useLocalDpi xmlns:a14="http://schemas.microsoft.com/office/drawing/2010/main" val="0"/>
+              </a:ext>
+            </a:extLst>
+          </a:blip>
+          <a:stretch>
+            <a:fillRect/>
+          </a:stretch>
+        </p:blipFill>
+        <p:spPr>
+          <a:xfrm>
+            <a:off x="543050" y="2159001"/>
+            <a:ext cx="3379839" cy="2494643"/>
+          </a:xfrm>
+          <a:prstGeom prst="rect">
+            <a:avLst/>
+          </a:prstGeom>
+        </p:spPr>
+      </p:pic>
+      <p:pic>
+        <p:nvPicPr>
+          <p:cNvPr id="11" name="Picture 10" descr="Test_Graph_k_4.png"/>
+          <p:cNvPicPr>
+            <a:picLocks noChangeAspect="1"/>
+          </p:cNvPicPr>
+          <p:nvPr/>
+        </p:nvPicPr>
+        <p:blipFill>
+          <a:blip r:embed="rId4">
+            <a:extLst>
+              <a:ext uri="{28A0092B-C50C-407E-A947-70E740481C1C}">
+                <a14:useLocalDpi xmlns:a14="http://schemas.microsoft.com/office/drawing/2010/main" val="0"/>
+              </a:ext>
+            </a:extLst>
+          </a:blip>
+          <a:stretch>
+            <a:fillRect/>
+          </a:stretch>
+        </p:blipFill>
+        <p:spPr>
+          <a:xfrm>
+            <a:off x="543050" y="5007275"/>
+            <a:ext cx="3570111" cy="1572549"/>
+          </a:xfrm>
+          <a:prstGeom prst="rect">
+            <a:avLst/>
+          </a:prstGeom>
+        </p:spPr>
+      </p:pic>
+      <p:sp>
+        <p:nvSpPr>
+          <p:cNvPr id="12" name="Oval 11"/>
+          <p:cNvSpPr/>
+          <p:nvPr/>
+        </p:nvSpPr>
+        <p:spPr>
+          <a:xfrm>
+            <a:off x="945447" y="2173112"/>
+            <a:ext cx="437442" cy="332244"/>
+          </a:xfrm>
+          <a:prstGeom prst="ellipse">
+            <a:avLst/>
+          </a:prstGeom>
+          <a:noFill/>
+          <a:ln>
+            <a:solidFill>
+              <a:srgbClr val="C66951"/>
+            </a:solidFill>
+          </a:ln>
+          <a:effectLst/>
+        </p:spPr>
+        <p:style>
+          <a:lnRef idx="1">
+            <a:schemeClr val="accent1"/>
+          </a:lnRef>
+          <a:fillRef idx="3">
+            <a:schemeClr val="accent1"/>
+          </a:fillRef>
+          <a:effectRef idx="2">
+            <a:schemeClr val="accent1"/>
+          </a:effectRef>
+          <a:fontRef idx="minor">
+            <a:schemeClr val="lt1"/>
+          </a:fontRef>
+        </p:style>
+        <p:txBody>
+          <a:bodyPr rtlCol="0" anchor="ctr"/>
+          <a:lstStyle/>
+          <a:p>
+            <a:pPr algn="ctr"/>
+            <a:r>
+              <a:rPr lang="en-US" sz="2400" dirty="0" smtClean="0">
+                <a:solidFill>
+                  <a:schemeClr val="accent1"/>
+                </a:solidFill>
+              </a:rPr>
+              <a:t>I</a:t>
+            </a:r>
+            <a:endParaRPr lang="en-US" sz="2400" dirty="0">
+              <a:solidFill>
+                <a:schemeClr val="accent1"/>
+              </a:solidFill>
+            </a:endParaRPr>
+          </a:p>
+        </p:txBody>
+      </p:sp>
+      <p:sp>
+        <p:nvSpPr>
+          <p:cNvPr id="13" name="Oval 12"/>
+          <p:cNvSpPr/>
+          <p:nvPr/>
+        </p:nvSpPr>
+        <p:spPr>
+          <a:xfrm>
+            <a:off x="2523068" y="2180802"/>
+            <a:ext cx="437442" cy="332244"/>
+          </a:xfrm>
+          <a:prstGeom prst="ellipse">
+            <a:avLst/>
+          </a:prstGeom>
+          <a:noFill/>
+          <a:ln>
+            <a:solidFill>
+              <a:srgbClr val="C66951"/>
+            </a:solidFill>
+          </a:ln>
+          <a:effectLst/>
+        </p:spPr>
+        <p:style>
+          <a:lnRef idx="1">
+            <a:schemeClr val="accent1"/>
+          </a:lnRef>
+          <a:fillRef idx="3">
+            <a:schemeClr val="accent1"/>
+          </a:fillRef>
+          <a:effectRef idx="2">
+            <a:schemeClr val="accent1"/>
+          </a:effectRef>
+          <a:fontRef idx="minor">
+            <a:schemeClr val="lt1"/>
+          </a:fontRef>
+        </p:style>
+        <p:txBody>
+          <a:bodyPr rtlCol="0" anchor="ctr"/>
+          <a:lstStyle/>
+          <a:p>
+            <a:pPr algn="ctr"/>
+            <a:r>
+              <a:rPr lang="en-US" sz="2400" dirty="0">
+                <a:solidFill>
+                  <a:schemeClr val="accent1"/>
+                </a:solidFill>
+              </a:rPr>
+              <a:t>V</a:t>
+            </a:r>
+            <a:endParaRPr lang="en-US" sz="2400" dirty="0">
+              <a:solidFill>
+                <a:schemeClr val="accent1"/>
+              </a:solidFill>
+            </a:endParaRPr>
+          </a:p>
+        </p:txBody>
+      </p:sp>
+      <p:sp>
+        <p:nvSpPr>
+          <p:cNvPr id="14" name="Oval 13"/>
+          <p:cNvSpPr/>
+          <p:nvPr/>
+        </p:nvSpPr>
+        <p:spPr>
+          <a:xfrm>
+            <a:off x="879126" y="5007275"/>
+            <a:ext cx="390874" cy="314852"/>
+          </a:xfrm>
+          <a:prstGeom prst="ellipse">
+            <a:avLst/>
+          </a:prstGeom>
+          <a:noFill/>
+          <a:ln>
+            <a:solidFill>
+              <a:srgbClr val="C66951"/>
+            </a:solidFill>
+          </a:ln>
+          <a:effectLst/>
+        </p:spPr>
+        <p:style>
+          <a:lnRef idx="1">
+            <a:schemeClr val="accent1"/>
+          </a:lnRef>
+          <a:fillRef idx="3">
+            <a:schemeClr val="accent1"/>
+          </a:fillRef>
+          <a:effectRef idx="2">
+            <a:schemeClr val="accent1"/>
+          </a:effectRef>
+          <a:fontRef idx="minor">
+            <a:schemeClr val="lt1"/>
+          </a:fontRef>
+        </p:style>
+        <p:txBody>
+          <a:bodyPr rtlCol="0" anchor="ctr"/>
+          <a:lstStyle/>
+          <a:p>
+            <a:pPr algn="ctr"/>
+            <a:r>
+              <a:rPr lang="en-US" sz="2400" dirty="0" smtClean="0">
+                <a:solidFill>
+                  <a:schemeClr val="accent1"/>
+                </a:solidFill>
+              </a:rPr>
+              <a:t>I</a:t>
+            </a:r>
+            <a:endParaRPr lang="en-US" sz="2400" dirty="0">
+              <a:solidFill>
+                <a:schemeClr val="accent1"/>
+              </a:solidFill>
+            </a:endParaRPr>
+          </a:p>
+        </p:txBody>
+      </p:sp>
+      <p:sp>
+        <p:nvSpPr>
+          <p:cNvPr id="15" name="Oval 14"/>
+          <p:cNvSpPr/>
+          <p:nvPr/>
+        </p:nvSpPr>
+        <p:spPr>
+          <a:xfrm>
+            <a:off x="2856091" y="5017203"/>
+            <a:ext cx="390874" cy="314852"/>
+          </a:xfrm>
+          <a:prstGeom prst="ellipse">
+            <a:avLst/>
+          </a:prstGeom>
+          <a:noFill/>
+          <a:ln>
+            <a:solidFill>
+              <a:srgbClr val="C66951"/>
+            </a:solidFill>
+          </a:ln>
+          <a:effectLst/>
+        </p:spPr>
+        <p:style>
+          <a:lnRef idx="1">
+            <a:schemeClr val="accent1"/>
+          </a:lnRef>
+          <a:fillRef idx="3">
+            <a:schemeClr val="accent1"/>
+          </a:fillRef>
+          <a:effectRef idx="2">
+            <a:schemeClr val="accent1"/>
+          </a:effectRef>
+          <a:fontRef idx="minor">
+            <a:schemeClr val="lt1"/>
+          </a:fontRef>
+        </p:style>
+        <p:txBody>
+          <a:bodyPr rtlCol="0" anchor="ctr"/>
+          <a:lstStyle/>
+          <a:p>
+            <a:pPr algn="ctr"/>
+            <a:r>
+              <a:rPr lang="en-US" sz="2400" dirty="0">
+                <a:solidFill>
+                  <a:schemeClr val="accent1"/>
+                </a:solidFill>
+              </a:rPr>
+              <a:t>V</a:t>
+            </a:r>
+            <a:endParaRPr lang="en-US" sz="2400" dirty="0">
+              <a:solidFill>
+                <a:schemeClr val="accent1"/>
+              </a:solidFill>
+            </a:endParaRPr>
+          </a:p>
+        </p:txBody>
+      </p:sp>
+      <p:sp>
+        <p:nvSpPr>
+          <p:cNvPr id="16" name="Oval 15"/>
+          <p:cNvSpPr/>
+          <p:nvPr/>
+        </p:nvSpPr>
+        <p:spPr>
+          <a:xfrm>
+            <a:off x="3331631" y="2173112"/>
+            <a:ext cx="437442" cy="332244"/>
+          </a:xfrm>
+          <a:prstGeom prst="ellipse">
+            <a:avLst/>
+          </a:prstGeom>
+          <a:noFill/>
+          <a:ln>
+            <a:solidFill>
+              <a:srgbClr val="C66951"/>
+            </a:solidFill>
+          </a:ln>
+          <a:effectLst/>
+        </p:spPr>
+        <p:style>
+          <a:lnRef idx="1">
+            <a:schemeClr val="accent1"/>
+          </a:lnRef>
+          <a:fillRef idx="3">
+            <a:schemeClr val="accent1"/>
+          </a:fillRef>
+          <a:effectRef idx="2">
+            <a:schemeClr val="accent1"/>
+          </a:effectRef>
+          <a:fontRef idx="minor">
+            <a:schemeClr val="lt1"/>
+          </a:fontRef>
+        </p:style>
+        <p:txBody>
+          <a:bodyPr rtlCol="0" anchor="ctr"/>
+          <a:lstStyle/>
+          <a:p>
+            <a:pPr algn="ctr"/>
+            <a:r>
+              <a:rPr lang="en-US" sz="2400" dirty="0" smtClean="0">
+                <a:solidFill>
+                  <a:schemeClr val="accent1"/>
+                </a:solidFill>
+              </a:rPr>
+              <a:t>P</a:t>
+            </a:r>
+            <a:endParaRPr lang="en-US" sz="2400" dirty="0">
+              <a:solidFill>
+                <a:schemeClr val="accent1"/>
+              </a:solidFill>
+            </a:endParaRPr>
+          </a:p>
+        </p:txBody>
+      </p:sp>
+      <p:sp>
+        <p:nvSpPr>
+          <p:cNvPr id="19" name="Oval 18"/>
+          <p:cNvSpPr/>
+          <p:nvPr/>
+        </p:nvSpPr>
+        <p:spPr>
+          <a:xfrm>
+            <a:off x="3572931" y="5014382"/>
+            <a:ext cx="390874" cy="314852"/>
+          </a:xfrm>
+          <a:prstGeom prst="ellipse">
+            <a:avLst/>
+          </a:prstGeom>
+          <a:noFill/>
+          <a:ln>
+            <a:solidFill>
+              <a:srgbClr val="C66951"/>
+            </a:solidFill>
+          </a:ln>
+          <a:effectLst/>
+        </p:spPr>
+        <p:style>
+          <a:lnRef idx="1">
+            <a:schemeClr val="accent1"/>
+          </a:lnRef>
+          <a:fillRef idx="3">
+            <a:schemeClr val="accent1"/>
+          </a:fillRef>
+          <a:effectRef idx="2">
+            <a:schemeClr val="accent1"/>
+          </a:effectRef>
+          <a:fontRef idx="minor">
+            <a:schemeClr val="lt1"/>
+          </a:fontRef>
+        </p:style>
+        <p:txBody>
+          <a:bodyPr rtlCol="0" anchor="ctr"/>
+          <a:lstStyle/>
+          <a:p>
+            <a:pPr algn="ctr"/>
+            <a:r>
+              <a:rPr lang="en-US" sz="2400" dirty="0" smtClean="0">
+                <a:solidFill>
+                  <a:schemeClr val="accent1"/>
+                </a:solidFill>
+              </a:rPr>
+              <a:t>P</a:t>
+            </a:r>
+            <a:endParaRPr lang="en-US" sz="2400" dirty="0">
+              <a:solidFill>
+                <a:schemeClr val="accent1"/>
+              </a:solidFill>
+            </a:endParaRPr>
           </a:p>
         </p:txBody>
       </p:sp>
     </p:spTree>
     <p:extLst>
       <p:ext uri="{BB962C8B-B14F-4D97-AF65-F5344CB8AC3E}">
-        <p14:creationId xmlns:p14="http://schemas.microsoft.com/office/powerpoint/2010/main" val="2127887728"/>
+        <p14:creationId xmlns:p14="http://schemas.microsoft.com/office/powerpoint/2010/main" val="2155405247"/>
       </p:ext>
     </p:extLst>
   </p:cSld>

</xml_diff>

<commit_message>
Some title changes and README.txt
</commit_message>
<xml_diff>
--- a/PPI_Networks_Presentation.pptx
+++ b/PPI_Networks_Presentation.pptx
@@ -7210,12 +7210,12 @@
           <a:p>
             <a:pPr lvl="1"/>
             <a:r>
-              <a:rPr lang="en-US" dirty="0" err="1" smtClean="0"/>
-              <a:t>ColorCoding</a:t>
-            </a:r>
-            <a:r>
-              <a:rPr lang="en-US" dirty="0" smtClean="0"/>
-              <a:t>(N, I k)</a:t>
+              <a:rPr lang="en-US" smtClean="0"/>
+              <a:t>PPICompute(</a:t>
+            </a:r>
+            <a:r>
+              <a:rPr lang="en-US" dirty="0" smtClean="0"/>
+              <a:t>N, I k)</a:t>
             </a:r>
           </a:p>
           <a:p>
@@ -7286,10 +7286,7 @@
               <a:rPr lang="en-US" dirty="0" err="1" smtClean="0"/>
               <a:t>README.txt</a:t>
             </a:r>
-            <a:r>
-              <a:rPr lang="en-US" dirty="0" smtClean="0"/>
-              <a:t> in PROGRAMS</a:t>
-            </a:r>
+            <a:endParaRPr lang="en-US" dirty="0" smtClean="0"/>
           </a:p>
           <a:p>
             <a:pPr lvl="1"/>
@@ -7803,11 +7800,6 @@
               </a:rPr>
               <a:t>V</a:t>
             </a:r>
-            <a:endParaRPr lang="en-US" sz="2400" dirty="0">
-              <a:solidFill>
-                <a:schemeClr val="accent1"/>
-              </a:solidFill>
-            </a:endParaRPr>
           </a:p>
         </p:txBody>
       </p:sp>
@@ -7917,11 +7909,6 @@
               </a:rPr>
               <a:t>V</a:t>
             </a:r>
-            <a:endParaRPr lang="en-US" sz="2400" dirty="0">
-              <a:solidFill>
-                <a:schemeClr val="accent1"/>
-              </a:solidFill>
-            </a:endParaRPr>
           </a:p>
         </p:txBody>
       </p:sp>

</xml_diff>